<commit_message>
Completing App Block Diagram
</commit_message>
<xml_diff>
--- a/docs/AppBlockDiagram.pptx
+++ b/docs/AppBlockDiagram.pptx
@@ -3103,7 +3103,7 @@
         </p:nvSpPr>
         <p:spPr>
           <a:xfrm>
-            <a:off x="1304172" y="2871015"/>
+            <a:off x="1327595" y="2871015"/>
             <a:ext cx="1569024" cy="879699"/>
           </a:xfrm>
           <a:prstGeom prst="ellipse">
@@ -3145,7 +3145,7 @@
         </p:nvSpPr>
         <p:spPr>
           <a:xfrm>
-            <a:off x="4787815" y="2260550"/>
+            <a:off x="4787815" y="2871447"/>
             <a:ext cx="1569024" cy="879699"/>
           </a:xfrm>
           <a:prstGeom prst="ellipse">
@@ -3229,7 +3229,7 @@
         </p:nvSpPr>
         <p:spPr>
           <a:xfrm>
-            <a:off x="924202" y="4060144"/>
+            <a:off x="924202" y="4843832"/>
             <a:ext cx="2375810" cy="1290918"/>
           </a:xfrm>
           <a:prstGeom prst="diamond">
@@ -3313,7 +3313,7 @@
         </p:nvSpPr>
         <p:spPr>
           <a:xfrm>
-            <a:off x="5953445" y="1002308"/>
+            <a:off x="5953445" y="960666"/>
             <a:ext cx="2375810" cy="1290918"/>
           </a:xfrm>
           <a:prstGeom prst="diamond">
@@ -3357,9 +3357,9 @@
           <p:nvPr/>
         </p:nvCxnSpPr>
         <p:spPr>
-          <a:xfrm flipH="1">
-            <a:off x="2088684" y="2260550"/>
-            <a:ext cx="23423" cy="610465"/>
+          <a:xfrm>
+            <a:off x="2112107" y="2260550"/>
+            <a:ext cx="0" cy="610465"/>
           </a:xfrm>
           <a:prstGeom prst="straightConnector1">
             <a:avLst/>
@@ -3393,9 +3393,9 @@
           <p:nvPr/>
         </p:nvCxnSpPr>
         <p:spPr>
-          <a:xfrm>
-            <a:off x="3300012" y="1615091"/>
-            <a:ext cx="2653433" cy="32676"/>
+          <a:xfrm flipV="1">
+            <a:off x="3300012" y="1606125"/>
+            <a:ext cx="2653433" cy="8966"/>
           </a:xfrm>
           <a:prstGeom prst="straightConnector1">
             <a:avLst/>
@@ -3430,8 +3430,8 @@
         </p:nvCxnSpPr>
         <p:spPr>
           <a:xfrm flipH="1">
-            <a:off x="5953445" y="1647767"/>
-            <a:ext cx="2375810" cy="3401675"/>
+            <a:off x="5953445" y="1606125"/>
+            <a:ext cx="2375810" cy="3443317"/>
           </a:xfrm>
           <a:prstGeom prst="bentConnector3">
             <a:avLst>
@@ -3467,13 +3467,13 @@
           <p:nvPr/>
         </p:nvCxnSpPr>
         <p:spPr>
-          <a:xfrm rot="16200000" flipH="1">
-            <a:off x="3571406" y="3891763"/>
-            <a:ext cx="138229" cy="3056826"/>
+          <a:xfrm rot="5400000" flipH="1" flipV="1">
+            <a:off x="3317790" y="4283608"/>
+            <a:ext cx="645459" cy="3056826"/>
           </a:xfrm>
           <a:prstGeom prst="bentConnector3">
             <a:avLst>
-              <a:gd name="adj1" fmla="val 265378"/>
+              <a:gd name="adj1" fmla="val -35417"/>
             </a:avLst>
           </a:prstGeom>
           <a:ln>
@@ -3495,6 +3495,1010 @@
           </a:fontRef>
         </p:style>
       </p:cxnSp>
+      <p:cxnSp>
+        <p:nvCxnSpPr>
+          <p:cNvPr id="23" name="Elbow Connector 22"/>
+          <p:cNvCxnSpPr>
+            <a:stCxn id="8" idx="3"/>
+            <a:endCxn id="10" idx="3"/>
+          </p:cNvCxnSpPr>
+          <p:nvPr/>
+        </p:nvCxnSpPr>
+        <p:spPr>
+          <a:xfrm rot="5400000">
+            <a:off x="3892692" y="4767783"/>
+            <a:ext cx="128829" cy="1314187"/>
+          </a:xfrm>
+          <a:prstGeom prst="bentConnector4">
+            <a:avLst>
+              <a:gd name="adj1" fmla="val 177445"/>
+              <a:gd name="adj2" fmla="val 58742"/>
+            </a:avLst>
+          </a:prstGeom>
+          <a:ln>
+            <a:tailEnd type="arrow"/>
+          </a:ln>
+        </p:spPr>
+        <p:style>
+          <a:lnRef idx="2">
+            <a:schemeClr val="accent1"/>
+          </a:lnRef>
+          <a:fillRef idx="0">
+            <a:schemeClr val="accent1"/>
+          </a:fillRef>
+          <a:effectRef idx="1">
+            <a:schemeClr val="accent1"/>
+          </a:effectRef>
+          <a:fontRef idx="minor">
+            <a:schemeClr val="tx1"/>
+          </a:fontRef>
+        </p:style>
+      </p:cxnSp>
+      <p:cxnSp>
+        <p:nvCxnSpPr>
+          <p:cNvPr id="25" name="Elbow Connector 24"/>
+          <p:cNvCxnSpPr>
+            <a:stCxn id="10" idx="1"/>
+            <a:endCxn id="6" idx="3"/>
+          </p:cNvCxnSpPr>
+          <p:nvPr/>
+        </p:nvCxnSpPr>
+        <p:spPr>
+          <a:xfrm rot="10800000" flipH="1">
+            <a:off x="924201" y="3621885"/>
+            <a:ext cx="633171" cy="1867406"/>
+          </a:xfrm>
+          <a:prstGeom prst="bentConnector4">
+            <a:avLst>
+              <a:gd name="adj1" fmla="val -36104"/>
+              <a:gd name="adj2" fmla="val 63833"/>
+            </a:avLst>
+          </a:prstGeom>
+          <a:ln>
+            <a:tailEnd type="arrow"/>
+          </a:ln>
+        </p:spPr>
+        <p:style>
+          <a:lnRef idx="2">
+            <a:schemeClr val="accent1"/>
+          </a:lnRef>
+          <a:fillRef idx="0">
+            <a:schemeClr val="accent1"/>
+          </a:fillRef>
+          <a:effectRef idx="1">
+            <a:schemeClr val="accent1"/>
+          </a:effectRef>
+          <a:fontRef idx="minor">
+            <a:schemeClr val="tx1"/>
+          </a:fontRef>
+        </p:style>
+      </p:cxnSp>
+      <p:cxnSp>
+        <p:nvCxnSpPr>
+          <p:cNvPr id="28" name="Elbow Connector 27"/>
+          <p:cNvCxnSpPr>
+            <a:stCxn id="6" idx="2"/>
+            <a:endCxn id="11" idx="0"/>
+          </p:cNvCxnSpPr>
+          <p:nvPr/>
+        </p:nvCxnSpPr>
+        <p:spPr>
+          <a:xfrm rot="10800000" flipH="1">
+            <a:off x="1327595" y="969633"/>
+            <a:ext cx="784512" cy="2341233"/>
+          </a:xfrm>
+          <a:prstGeom prst="bentConnector4">
+            <a:avLst>
+              <a:gd name="adj1" fmla="val -80559"/>
+              <a:gd name="adj2" fmla="val 109764"/>
+            </a:avLst>
+          </a:prstGeom>
+          <a:ln>
+            <a:tailEnd type="arrow"/>
+          </a:ln>
+        </p:spPr>
+        <p:style>
+          <a:lnRef idx="2">
+            <a:schemeClr val="accent1"/>
+          </a:lnRef>
+          <a:fillRef idx="0">
+            <a:schemeClr val="accent1"/>
+          </a:fillRef>
+          <a:effectRef idx="1">
+            <a:schemeClr val="accent1"/>
+          </a:effectRef>
+          <a:fontRef idx="minor">
+            <a:schemeClr val="tx1"/>
+          </a:fontRef>
+        </p:style>
+      </p:cxnSp>
+      <p:cxnSp>
+        <p:nvCxnSpPr>
+          <p:cNvPr id="31" name="Straight Arrow Connector 30"/>
+          <p:cNvCxnSpPr>
+            <a:stCxn id="6" idx="6"/>
+            <a:endCxn id="7" idx="2"/>
+          </p:cNvCxnSpPr>
+          <p:nvPr/>
+        </p:nvCxnSpPr>
+        <p:spPr>
+          <a:xfrm>
+            <a:off x="2896619" y="3310865"/>
+            <a:ext cx="1891196" cy="432"/>
+          </a:xfrm>
+          <a:prstGeom prst="straightConnector1">
+            <a:avLst/>
+          </a:prstGeom>
+          <a:ln>
+            <a:tailEnd type="arrow"/>
+          </a:ln>
+        </p:spPr>
+        <p:style>
+          <a:lnRef idx="2">
+            <a:schemeClr val="accent1"/>
+          </a:lnRef>
+          <a:fillRef idx="0">
+            <a:schemeClr val="accent1"/>
+          </a:fillRef>
+          <a:effectRef idx="1">
+            <a:schemeClr val="accent1"/>
+          </a:effectRef>
+          <a:fontRef idx="minor">
+            <a:schemeClr val="tx1"/>
+          </a:fontRef>
+        </p:style>
+      </p:cxnSp>
+      <p:cxnSp>
+        <p:nvCxnSpPr>
+          <p:cNvPr id="35" name="Straight Arrow Connector 34"/>
+          <p:cNvCxnSpPr>
+            <a:endCxn id="11" idx="0"/>
+          </p:cNvCxnSpPr>
+          <p:nvPr/>
+        </p:nvCxnSpPr>
+        <p:spPr>
+          <a:xfrm>
+            <a:off x="2112106" y="437246"/>
+            <a:ext cx="1" cy="532386"/>
+          </a:xfrm>
+          <a:prstGeom prst="straightConnector1">
+            <a:avLst/>
+          </a:prstGeom>
+          <a:ln>
+            <a:tailEnd type="arrow"/>
+          </a:ln>
+        </p:spPr>
+        <p:style>
+          <a:lnRef idx="2">
+            <a:schemeClr val="accent1"/>
+          </a:lnRef>
+          <a:fillRef idx="0">
+            <a:schemeClr val="accent1"/>
+          </a:fillRef>
+          <a:effectRef idx="1">
+            <a:schemeClr val="accent1"/>
+          </a:effectRef>
+          <a:fontRef idx="minor">
+            <a:schemeClr val="tx1"/>
+          </a:fontRef>
+        </p:style>
+      </p:cxnSp>
+      <p:cxnSp>
+        <p:nvCxnSpPr>
+          <p:cNvPr id="43" name="Elbow Connector 42"/>
+          <p:cNvCxnSpPr>
+            <a:stCxn id="7" idx="6"/>
+            <a:endCxn id="6" idx="5"/>
+          </p:cNvCxnSpPr>
+          <p:nvPr/>
+        </p:nvCxnSpPr>
+        <p:spPr>
+          <a:xfrm flipH="1">
+            <a:off x="2666841" y="3311297"/>
+            <a:ext cx="3689998" cy="310588"/>
+          </a:xfrm>
+          <a:prstGeom prst="bentConnector4">
+            <a:avLst>
+              <a:gd name="adj1" fmla="val -6195"/>
+              <a:gd name="adj2" fmla="val 215220"/>
+            </a:avLst>
+          </a:prstGeom>
+          <a:ln>
+            <a:tailEnd type="arrow"/>
+          </a:ln>
+        </p:spPr>
+        <p:style>
+          <a:lnRef idx="2">
+            <a:schemeClr val="accent1"/>
+          </a:lnRef>
+          <a:fillRef idx="0">
+            <a:schemeClr val="accent1"/>
+          </a:fillRef>
+          <a:effectRef idx="1">
+            <a:schemeClr val="accent1"/>
+          </a:effectRef>
+          <a:fontRef idx="minor">
+            <a:schemeClr val="tx1"/>
+          </a:fontRef>
+        </p:style>
+      </p:cxnSp>
+      <p:cxnSp>
+        <p:nvCxnSpPr>
+          <p:cNvPr id="45" name="Elbow Connector 44"/>
+          <p:cNvCxnSpPr>
+            <a:stCxn id="6" idx="4"/>
+            <a:endCxn id="8" idx="0"/>
+          </p:cNvCxnSpPr>
+          <p:nvPr/>
+        </p:nvCxnSpPr>
+        <p:spPr>
+          <a:xfrm rot="16200000" flipH="1">
+            <a:off x="3211081" y="2651740"/>
+            <a:ext cx="858878" cy="3056826"/>
+          </a:xfrm>
+          <a:prstGeom prst="bentConnector3">
+            <a:avLst/>
+          </a:prstGeom>
+          <a:ln>
+            <a:tailEnd type="arrow"/>
+          </a:ln>
+        </p:spPr>
+        <p:style>
+          <a:lnRef idx="2">
+            <a:schemeClr val="accent1"/>
+          </a:lnRef>
+          <a:fillRef idx="0">
+            <a:schemeClr val="accent1"/>
+          </a:fillRef>
+          <a:effectRef idx="1">
+            <a:schemeClr val="accent1"/>
+          </a:effectRef>
+          <a:fontRef idx="minor">
+            <a:schemeClr val="tx1"/>
+          </a:fontRef>
+        </p:style>
+      </p:cxnSp>
+      <p:cxnSp>
+        <p:nvCxnSpPr>
+          <p:cNvPr id="61" name="Curved Connector 60"/>
+          <p:cNvCxnSpPr>
+            <a:stCxn id="8" idx="6"/>
+            <a:endCxn id="8" idx="5"/>
+          </p:cNvCxnSpPr>
+          <p:nvPr/>
+        </p:nvCxnSpPr>
+        <p:spPr>
+          <a:xfrm flipH="1">
+            <a:off x="5723667" y="5049442"/>
+            <a:ext cx="229778" cy="311020"/>
+          </a:xfrm>
+          <a:prstGeom prst="curvedConnector4">
+            <a:avLst>
+              <a:gd name="adj1" fmla="val -253525"/>
+              <a:gd name="adj2" fmla="val 265130"/>
+            </a:avLst>
+          </a:prstGeom>
+          <a:ln>
+            <a:tailEnd type="arrow"/>
+          </a:ln>
+        </p:spPr>
+        <p:style>
+          <a:lnRef idx="2">
+            <a:schemeClr val="accent1"/>
+          </a:lnRef>
+          <a:fillRef idx="0">
+            <a:schemeClr val="accent1"/>
+          </a:fillRef>
+          <a:effectRef idx="1">
+            <a:schemeClr val="accent1"/>
+          </a:effectRef>
+          <a:fontRef idx="minor">
+            <a:schemeClr val="tx1"/>
+          </a:fontRef>
+        </p:style>
+      </p:cxnSp>
+      <p:cxnSp>
+        <p:nvCxnSpPr>
+          <p:cNvPr id="72" name="Curved Connector 71"/>
+          <p:cNvCxnSpPr>
+            <a:stCxn id="8" idx="1"/>
+            <a:endCxn id="8" idx="2"/>
+          </p:cNvCxnSpPr>
+          <p:nvPr/>
+        </p:nvCxnSpPr>
+        <p:spPr>
+          <a:xfrm rot="16200000" flipH="1" flipV="1">
+            <a:off x="4343799" y="4779042"/>
+            <a:ext cx="311021" cy="229778"/>
+          </a:xfrm>
+          <a:prstGeom prst="curvedConnector4">
+            <a:avLst>
+              <a:gd name="adj1" fmla="val -114921"/>
+              <a:gd name="adj2" fmla="val 290097"/>
+            </a:avLst>
+          </a:prstGeom>
+          <a:ln>
+            <a:tailEnd type="arrow"/>
+          </a:ln>
+        </p:spPr>
+        <p:style>
+          <a:lnRef idx="2">
+            <a:schemeClr val="accent1"/>
+          </a:lnRef>
+          <a:fillRef idx="0">
+            <a:schemeClr val="accent1"/>
+          </a:fillRef>
+          <a:effectRef idx="1">
+            <a:schemeClr val="accent1"/>
+          </a:effectRef>
+          <a:fontRef idx="minor">
+            <a:schemeClr val="tx1"/>
+          </a:fontRef>
+        </p:style>
+      </p:cxnSp>
+      <p:cxnSp>
+        <p:nvCxnSpPr>
+          <p:cNvPr id="78" name="Curved Connector 77"/>
+          <p:cNvCxnSpPr>
+            <a:stCxn id="6" idx="2"/>
+            <a:endCxn id="6" idx="1"/>
+          </p:cNvCxnSpPr>
+          <p:nvPr/>
+        </p:nvCxnSpPr>
+        <p:spPr>
+          <a:xfrm rot="10800000" flipH="1">
+            <a:off x="1327595" y="2999845"/>
+            <a:ext cx="229778" cy="311021"/>
+          </a:xfrm>
+          <a:prstGeom prst="curvedConnector4">
+            <a:avLst>
+              <a:gd name="adj1" fmla="val -185567"/>
+              <a:gd name="adj2" fmla="val 218268"/>
+            </a:avLst>
+          </a:prstGeom>
+          <a:ln>
+            <a:tailEnd type="arrow"/>
+          </a:ln>
+        </p:spPr>
+        <p:style>
+          <a:lnRef idx="2">
+            <a:schemeClr val="accent1"/>
+          </a:lnRef>
+          <a:fillRef idx="0">
+            <a:schemeClr val="accent1"/>
+          </a:fillRef>
+          <a:effectRef idx="1">
+            <a:schemeClr val="accent1"/>
+          </a:effectRef>
+          <a:fontRef idx="minor">
+            <a:schemeClr val="tx1"/>
+          </a:fontRef>
+        </p:style>
+      </p:cxnSp>
+      <p:sp>
+        <p:nvSpPr>
+          <p:cNvPr id="95" name="TextBox 94"/>
+          <p:cNvSpPr txBox="1"/>
+          <p:nvPr/>
+        </p:nvSpPr>
+        <p:spPr>
+          <a:xfrm>
+            <a:off x="1327595" y="98692"/>
+            <a:ext cx="1569024" cy="338554"/>
+          </a:xfrm>
+          <a:prstGeom prst="rect">
+            <a:avLst/>
+          </a:prstGeom>
+          <a:noFill/>
+        </p:spPr>
+        <p:txBody>
+          <a:bodyPr wrap="square" rtlCol="0">
+            <a:spAutoFit/>
+          </a:bodyPr>
+          <a:lstStyle/>
+          <a:p>
+            <a:pPr algn="ctr"/>
+            <a:r>
+              <a:rPr lang="en-US" sz="1600" dirty="0" smtClean="0"/>
+              <a:t>Startup</a:t>
+            </a:r>
+            <a:endParaRPr lang="en-US" sz="1600" dirty="0"/>
+          </a:p>
+        </p:txBody>
+      </p:sp>
+      <p:sp>
+        <p:nvSpPr>
+          <p:cNvPr id="96" name="TextBox 95"/>
+          <p:cNvSpPr txBox="1"/>
+          <p:nvPr/>
+        </p:nvSpPr>
+        <p:spPr>
+          <a:xfrm>
+            <a:off x="3679739" y="1204054"/>
+            <a:ext cx="1868920" cy="338554"/>
+          </a:xfrm>
+          <a:prstGeom prst="rect">
+            <a:avLst/>
+          </a:prstGeom>
+          <a:noFill/>
+        </p:spPr>
+        <p:txBody>
+          <a:bodyPr wrap="square" rtlCol="0">
+            <a:spAutoFit/>
+          </a:bodyPr>
+          <a:lstStyle/>
+          <a:p>
+            <a:pPr algn="ctr"/>
+            <a:r>
+              <a:rPr lang="en-US" sz="1600" dirty="0" smtClean="0"/>
+              <a:t>Get device info</a:t>
+            </a:r>
+            <a:endParaRPr lang="en-US" sz="1600" dirty="0"/>
+          </a:p>
+        </p:txBody>
+      </p:sp>
+      <p:sp>
+        <p:nvSpPr>
+          <p:cNvPr id="97" name="TextBox 96"/>
+          <p:cNvSpPr txBox="1"/>
+          <p:nvPr/>
+        </p:nvSpPr>
+        <p:spPr>
+          <a:xfrm rot="16200000">
+            <a:off x="-607539" y="1882380"/>
+            <a:ext cx="2098698" cy="338554"/>
+          </a:xfrm>
+          <a:prstGeom prst="rect">
+            <a:avLst/>
+          </a:prstGeom>
+          <a:noFill/>
+        </p:spPr>
+        <p:txBody>
+          <a:bodyPr wrap="square" rtlCol="0">
+            <a:spAutoFit/>
+          </a:bodyPr>
+          <a:lstStyle/>
+          <a:p>
+            <a:pPr algn="ctr"/>
+            <a:r>
+              <a:rPr lang="en-US" sz="1600" dirty="0" smtClean="0"/>
+              <a:t>Connect to a device</a:t>
+            </a:r>
+            <a:endParaRPr lang="en-US" sz="1600" dirty="0"/>
+          </a:p>
+        </p:txBody>
+      </p:sp>
+      <p:sp>
+        <p:nvSpPr>
+          <p:cNvPr id="98" name="TextBox 97"/>
+          <p:cNvSpPr txBox="1"/>
+          <p:nvPr/>
+        </p:nvSpPr>
+        <p:spPr>
+          <a:xfrm>
+            <a:off x="754265" y="2110831"/>
+            <a:ext cx="1146660" cy="584776"/>
+          </a:xfrm>
+          <a:prstGeom prst="rect">
+            <a:avLst/>
+          </a:prstGeom>
+          <a:noFill/>
+        </p:spPr>
+        <p:txBody>
+          <a:bodyPr wrap="square" rtlCol="0">
+            <a:spAutoFit/>
+          </a:bodyPr>
+          <a:lstStyle/>
+          <a:p>
+            <a:pPr algn="ctr"/>
+            <a:r>
+              <a:rPr lang="en-US" sz="1600" dirty="0" smtClean="0"/>
+              <a:t>Send commands</a:t>
+            </a:r>
+            <a:endParaRPr lang="en-US" sz="1600" dirty="0"/>
+          </a:p>
+        </p:txBody>
+      </p:sp>
+      <p:sp>
+        <p:nvSpPr>
+          <p:cNvPr id="99" name="TextBox 98"/>
+          <p:cNvSpPr txBox="1"/>
+          <p:nvPr/>
+        </p:nvSpPr>
+        <p:spPr>
+          <a:xfrm>
+            <a:off x="2809964" y="4446032"/>
+            <a:ext cx="1146660" cy="584776"/>
+          </a:xfrm>
+          <a:prstGeom prst="rect">
+            <a:avLst/>
+          </a:prstGeom>
+          <a:noFill/>
+        </p:spPr>
+        <p:txBody>
+          <a:bodyPr wrap="square" rtlCol="0">
+            <a:spAutoFit/>
+          </a:bodyPr>
+          <a:lstStyle/>
+          <a:p>
+            <a:pPr algn="ctr"/>
+            <a:r>
+              <a:rPr lang="en-US" sz="1600" dirty="0" smtClean="0"/>
+              <a:t>Send commands</a:t>
+            </a:r>
+            <a:endParaRPr lang="en-US" sz="1600" dirty="0"/>
+          </a:p>
+        </p:txBody>
+      </p:sp>
+      <p:sp>
+        <p:nvSpPr>
+          <p:cNvPr id="106" name="TextBox 105"/>
+          <p:cNvSpPr txBox="1"/>
+          <p:nvPr/>
+        </p:nvSpPr>
+        <p:spPr>
+          <a:xfrm>
+            <a:off x="3300013" y="1204054"/>
+            <a:ext cx="381117" cy="338554"/>
+          </a:xfrm>
+          <a:prstGeom prst="rect">
+            <a:avLst/>
+          </a:prstGeom>
+          <a:noFill/>
+        </p:spPr>
+        <p:txBody>
+          <a:bodyPr wrap="square" rtlCol="0">
+            <a:spAutoFit/>
+          </a:bodyPr>
+          <a:lstStyle/>
+          <a:p>
+            <a:pPr algn="ctr"/>
+            <a:r>
+              <a:rPr lang="en-US" sz="1600" dirty="0"/>
+              <a:t>Y</a:t>
+            </a:r>
+          </a:p>
+        </p:txBody>
+      </p:sp>
+      <p:sp>
+        <p:nvSpPr>
+          <p:cNvPr id="107" name="TextBox 106"/>
+          <p:cNvSpPr txBox="1"/>
+          <p:nvPr/>
+        </p:nvSpPr>
+        <p:spPr>
+          <a:xfrm>
+            <a:off x="8262737" y="1226711"/>
+            <a:ext cx="381117" cy="338554"/>
+          </a:xfrm>
+          <a:prstGeom prst="rect">
+            <a:avLst/>
+          </a:prstGeom>
+          <a:noFill/>
+        </p:spPr>
+        <p:txBody>
+          <a:bodyPr wrap="square" rtlCol="0">
+            <a:spAutoFit/>
+          </a:bodyPr>
+          <a:lstStyle/>
+          <a:p>
+            <a:pPr algn="ctr"/>
+            <a:r>
+              <a:rPr lang="en-US" sz="1600" dirty="0"/>
+              <a:t>Y</a:t>
+            </a:r>
+          </a:p>
+        </p:txBody>
+      </p:sp>
+      <p:sp>
+        <p:nvSpPr>
+          <p:cNvPr id="108" name="TextBox 107"/>
+          <p:cNvSpPr txBox="1"/>
+          <p:nvPr/>
+        </p:nvSpPr>
+        <p:spPr>
+          <a:xfrm>
+            <a:off x="2257938" y="5965474"/>
+            <a:ext cx="381117" cy="338554"/>
+          </a:xfrm>
+          <a:prstGeom prst="rect">
+            <a:avLst/>
+          </a:prstGeom>
+          <a:noFill/>
+        </p:spPr>
+        <p:txBody>
+          <a:bodyPr wrap="square" rtlCol="0">
+            <a:spAutoFit/>
+          </a:bodyPr>
+          <a:lstStyle/>
+          <a:p>
+            <a:pPr algn="ctr"/>
+            <a:r>
+              <a:rPr lang="en-US" sz="1600" dirty="0"/>
+              <a:t>Y</a:t>
+            </a:r>
+          </a:p>
+        </p:txBody>
+      </p:sp>
+      <p:sp>
+        <p:nvSpPr>
+          <p:cNvPr id="109" name="TextBox 108"/>
+          <p:cNvSpPr txBox="1"/>
+          <p:nvPr/>
+        </p:nvSpPr>
+        <p:spPr>
+          <a:xfrm>
+            <a:off x="589117" y="5556936"/>
+            <a:ext cx="381117" cy="338554"/>
+          </a:xfrm>
+          <a:prstGeom prst="rect">
+            <a:avLst/>
+          </a:prstGeom>
+          <a:noFill/>
+        </p:spPr>
+        <p:txBody>
+          <a:bodyPr wrap="square" rtlCol="0">
+            <a:spAutoFit/>
+          </a:bodyPr>
+          <a:lstStyle/>
+          <a:p>
+            <a:pPr algn="ctr"/>
+            <a:r>
+              <a:rPr lang="en-US" sz="1600" dirty="0" smtClean="0"/>
+              <a:t>N</a:t>
+            </a:r>
+            <a:endParaRPr lang="en-US" sz="1600" dirty="0"/>
+          </a:p>
+        </p:txBody>
+      </p:sp>
+      <p:sp>
+        <p:nvSpPr>
+          <p:cNvPr id="110" name="TextBox 109"/>
+          <p:cNvSpPr txBox="1"/>
+          <p:nvPr/>
+        </p:nvSpPr>
+        <p:spPr>
+          <a:xfrm>
+            <a:off x="2112106" y="2197005"/>
+            <a:ext cx="381117" cy="338554"/>
+          </a:xfrm>
+          <a:prstGeom prst="rect">
+            <a:avLst/>
+          </a:prstGeom>
+          <a:noFill/>
+        </p:spPr>
+        <p:txBody>
+          <a:bodyPr wrap="square" rtlCol="0">
+            <a:spAutoFit/>
+          </a:bodyPr>
+          <a:lstStyle/>
+          <a:p>
+            <a:pPr algn="ctr"/>
+            <a:r>
+              <a:rPr lang="en-US" sz="1600" dirty="0" smtClean="0"/>
+              <a:t>N</a:t>
+            </a:r>
+            <a:endParaRPr lang="en-US" sz="1600" dirty="0"/>
+          </a:p>
+        </p:txBody>
+      </p:sp>
+      <p:sp>
+        <p:nvSpPr>
+          <p:cNvPr id="111" name="TextBox 110"/>
+          <p:cNvSpPr txBox="1"/>
+          <p:nvPr/>
+        </p:nvSpPr>
+        <p:spPr>
+          <a:xfrm>
+            <a:off x="7141350" y="2231312"/>
+            <a:ext cx="381117" cy="338554"/>
+          </a:xfrm>
+          <a:prstGeom prst="rect">
+            <a:avLst/>
+          </a:prstGeom>
+          <a:noFill/>
+        </p:spPr>
+        <p:txBody>
+          <a:bodyPr wrap="square" rtlCol="0">
+            <a:spAutoFit/>
+          </a:bodyPr>
+          <a:lstStyle/>
+          <a:p>
+            <a:pPr algn="ctr"/>
+            <a:r>
+              <a:rPr lang="en-US" sz="1600" dirty="0" smtClean="0"/>
+              <a:t>N</a:t>
+            </a:r>
+            <a:endParaRPr lang="en-US" sz="1600" dirty="0"/>
+          </a:p>
+        </p:txBody>
+      </p:sp>
+      <p:sp>
+        <p:nvSpPr>
+          <p:cNvPr id="112" name="TextBox 111"/>
+          <p:cNvSpPr txBox="1"/>
+          <p:nvPr/>
+        </p:nvSpPr>
+        <p:spPr>
+          <a:xfrm>
+            <a:off x="2897679" y="2999845"/>
+            <a:ext cx="1868920" cy="338554"/>
+          </a:xfrm>
+          <a:prstGeom prst="rect">
+            <a:avLst/>
+          </a:prstGeom>
+          <a:noFill/>
+        </p:spPr>
+        <p:txBody>
+          <a:bodyPr wrap="square" rtlCol="0">
+            <a:spAutoFit/>
+          </a:bodyPr>
+          <a:lstStyle/>
+          <a:p>
+            <a:pPr algn="ctr"/>
+            <a:r>
+              <a:rPr lang="en-US" sz="1600" dirty="0" smtClean="0"/>
+              <a:t>Add device</a:t>
+            </a:r>
+            <a:endParaRPr lang="en-US" sz="1600" dirty="0"/>
+          </a:p>
+        </p:txBody>
+      </p:sp>
+      <p:cxnSp>
+        <p:nvCxnSpPr>
+          <p:cNvPr id="114" name="Elbow Connector 113"/>
+          <p:cNvCxnSpPr>
+            <a:stCxn id="12" idx="2"/>
+            <a:endCxn id="6" idx="0"/>
+          </p:cNvCxnSpPr>
+          <p:nvPr/>
+        </p:nvCxnSpPr>
+        <p:spPr>
+          <a:xfrm rot="5400000">
+            <a:off x="4317014" y="46678"/>
+            <a:ext cx="619431" cy="5029243"/>
+          </a:xfrm>
+          <a:prstGeom prst="bentConnector3">
+            <a:avLst/>
+          </a:prstGeom>
+          <a:ln>
+            <a:tailEnd type="arrow"/>
+          </a:ln>
+        </p:spPr>
+        <p:style>
+          <a:lnRef idx="2">
+            <a:schemeClr val="accent1"/>
+          </a:lnRef>
+          <a:fillRef idx="0">
+            <a:schemeClr val="accent1"/>
+          </a:fillRef>
+          <a:effectRef idx="1">
+            <a:schemeClr val="accent1"/>
+          </a:effectRef>
+          <a:fontRef idx="minor">
+            <a:schemeClr val="tx1"/>
+          </a:fontRef>
+        </p:style>
+      </p:cxnSp>
+      <p:sp>
+        <p:nvSpPr>
+          <p:cNvPr id="115" name="TextBox 114"/>
+          <p:cNvSpPr txBox="1"/>
+          <p:nvPr/>
+        </p:nvSpPr>
+        <p:spPr>
+          <a:xfrm>
+            <a:off x="6460334" y="5373945"/>
+            <a:ext cx="2183519" cy="1077218"/>
+          </a:xfrm>
+          <a:prstGeom prst="rect">
+            <a:avLst/>
+          </a:prstGeom>
+          <a:noFill/>
+        </p:spPr>
+        <p:txBody>
+          <a:bodyPr wrap="square" rtlCol="0">
+            <a:spAutoFit/>
+          </a:bodyPr>
+          <a:lstStyle/>
+          <a:p>
+            <a:r>
+              <a:rPr lang="en-US" sz="1600" dirty="0" smtClean="0"/>
+              <a:t>Miss keep alive or receive alarm message – add to alarming devices list</a:t>
+            </a:r>
+            <a:endParaRPr lang="en-US" sz="1600" dirty="0"/>
+          </a:p>
+        </p:txBody>
+      </p:sp>
+      <p:sp>
+        <p:nvSpPr>
+          <p:cNvPr id="116" name="TextBox 115"/>
+          <p:cNvSpPr txBox="1"/>
+          <p:nvPr/>
+        </p:nvSpPr>
+        <p:spPr>
+          <a:xfrm>
+            <a:off x="3300012" y="5626920"/>
+            <a:ext cx="1591071" cy="338554"/>
+          </a:xfrm>
+          <a:prstGeom prst="rect">
+            <a:avLst/>
+          </a:prstGeom>
+          <a:noFill/>
+        </p:spPr>
+        <p:txBody>
+          <a:bodyPr wrap="square" rtlCol="0">
+            <a:spAutoFit/>
+          </a:bodyPr>
+          <a:lstStyle/>
+          <a:p>
+            <a:pPr algn="ctr"/>
+            <a:r>
+              <a:rPr lang="en-US" sz="1600" dirty="0" smtClean="0"/>
+              <a:t>Disarm device</a:t>
+            </a:r>
+            <a:endParaRPr lang="en-US" sz="1600" dirty="0"/>
+          </a:p>
+        </p:txBody>
+      </p:sp>
+      <p:sp>
+        <p:nvSpPr>
+          <p:cNvPr id="117" name="TextBox 116"/>
+          <p:cNvSpPr txBox="1"/>
+          <p:nvPr/>
+        </p:nvSpPr>
+        <p:spPr>
+          <a:xfrm>
+            <a:off x="5402859" y="4199811"/>
+            <a:ext cx="2926396" cy="830997"/>
+          </a:xfrm>
+          <a:prstGeom prst="rect">
+            <a:avLst/>
+          </a:prstGeom>
+          <a:noFill/>
+        </p:spPr>
+        <p:txBody>
+          <a:bodyPr wrap="square" rtlCol="0">
+            <a:spAutoFit/>
+          </a:bodyPr>
+          <a:lstStyle/>
+          <a:p>
+            <a:pPr algn="ctr"/>
+            <a:r>
+              <a:rPr lang="en-US" sz="1600" dirty="0" smtClean="0"/>
+              <a:t>Miss keep alive or receive alarm message – add to alarming devices list</a:t>
+            </a:r>
+            <a:endParaRPr lang="en-US" sz="1600" dirty="0"/>
+          </a:p>
+        </p:txBody>
+      </p:sp>
+      <p:sp>
+        <p:nvSpPr>
+          <p:cNvPr id="118" name="TextBox 117"/>
+          <p:cNvSpPr txBox="1"/>
+          <p:nvPr/>
+        </p:nvSpPr>
+        <p:spPr>
+          <a:xfrm>
+            <a:off x="6568793" y="3283331"/>
+            <a:ext cx="1280447" cy="584776"/>
+          </a:xfrm>
+          <a:prstGeom prst="rect">
+            <a:avLst/>
+          </a:prstGeom>
+          <a:noFill/>
+        </p:spPr>
+        <p:txBody>
+          <a:bodyPr wrap="square" rtlCol="0">
+            <a:spAutoFit/>
+          </a:bodyPr>
+          <a:lstStyle/>
+          <a:p>
+            <a:r>
+              <a:rPr lang="en-US" sz="1600" dirty="0" smtClean="0"/>
+              <a:t>Paired – add device to list</a:t>
+            </a:r>
+            <a:endParaRPr lang="en-US" sz="1600" dirty="0"/>
+          </a:p>
+        </p:txBody>
+      </p:sp>
+      <p:cxnSp>
+        <p:nvCxnSpPr>
+          <p:cNvPr id="120" name="Straight Arrow Connector 119"/>
+          <p:cNvCxnSpPr>
+            <a:stCxn id="7" idx="3"/>
+            <a:endCxn id="6" idx="5"/>
+          </p:cNvCxnSpPr>
+          <p:nvPr/>
+        </p:nvCxnSpPr>
+        <p:spPr>
+          <a:xfrm flipH="1" flipV="1">
+            <a:off x="2666841" y="3621885"/>
+            <a:ext cx="2350752" cy="432"/>
+          </a:xfrm>
+          <a:prstGeom prst="straightConnector1">
+            <a:avLst/>
+          </a:prstGeom>
+          <a:ln>
+            <a:tailEnd type="arrow"/>
+          </a:ln>
+        </p:spPr>
+        <p:style>
+          <a:lnRef idx="2">
+            <a:schemeClr val="accent1"/>
+          </a:lnRef>
+          <a:fillRef idx="0">
+            <a:schemeClr val="accent1"/>
+          </a:fillRef>
+          <a:effectRef idx="1">
+            <a:schemeClr val="accent1"/>
+          </a:effectRef>
+          <a:fontRef idx="minor">
+            <a:schemeClr val="tx1"/>
+          </a:fontRef>
+        </p:style>
+      </p:cxnSp>
+      <p:sp>
+        <p:nvSpPr>
+          <p:cNvPr id="122" name="TextBox 121"/>
+          <p:cNvSpPr txBox="1"/>
+          <p:nvPr/>
+        </p:nvSpPr>
+        <p:spPr>
+          <a:xfrm>
+            <a:off x="3022164" y="3540145"/>
+            <a:ext cx="1868920" cy="338554"/>
+          </a:xfrm>
+          <a:prstGeom prst="rect">
+            <a:avLst/>
+          </a:prstGeom>
+          <a:noFill/>
+        </p:spPr>
+        <p:txBody>
+          <a:bodyPr wrap="square" rtlCol="0">
+            <a:spAutoFit/>
+          </a:bodyPr>
+          <a:lstStyle/>
+          <a:p>
+            <a:pPr algn="ctr"/>
+            <a:r>
+              <a:rPr lang="en-US" sz="1600" dirty="0" smtClean="0"/>
+              <a:t>Timeout</a:t>
+            </a:r>
+            <a:endParaRPr lang="en-US" sz="1600" dirty="0"/>
+          </a:p>
+        </p:txBody>
+      </p:sp>
+      <p:sp>
+        <p:nvSpPr>
+          <p:cNvPr id="123" name="TextBox 122"/>
+          <p:cNvSpPr txBox="1"/>
+          <p:nvPr/>
+        </p:nvSpPr>
+        <p:spPr>
+          <a:xfrm>
+            <a:off x="2150222" y="384857"/>
+            <a:ext cx="2076291" cy="584776"/>
+          </a:xfrm>
+          <a:prstGeom prst="rect">
+            <a:avLst/>
+          </a:prstGeom>
+          <a:noFill/>
+        </p:spPr>
+        <p:txBody>
+          <a:bodyPr wrap="square" rtlCol="0">
+            <a:spAutoFit/>
+          </a:bodyPr>
+          <a:lstStyle/>
+          <a:p>
+            <a:r>
+              <a:rPr lang="en-US" sz="1600" dirty="0" smtClean="0"/>
+              <a:t>Attempt to connect to all known devices</a:t>
+            </a:r>
+            <a:endParaRPr lang="en-US" sz="1600" dirty="0"/>
+          </a:p>
+        </p:txBody>
+      </p:sp>
     </p:spTree>
     <p:extLst>
       <p:ext uri="{BB962C8B-B14F-4D97-AF65-F5344CB8AC3E}">

</xml_diff>